<commit_message>
fix: minor typo fix
</commit_message>
<xml_diff>
--- a/Chapter1Part1.pptx
+++ b/Chapter1Part1.pptx
@@ -268,7 +268,7 @@
           <a:p>
             <a:fld id="{87AB81C4-7F73-9945-A8EE-FBB628EFA778}" type="datetimeFigureOut">
               <a:rPr lang="en-US" smtClean="0"/>
-              <a:t>12/31/25</a:t>
+              <a:t>1/3/26</a:t>
             </a:fld>
             <a:endParaRPr lang="en-US"/>
           </a:p>
@@ -468,7 +468,7 @@
           <a:p>
             <a:fld id="{87AB81C4-7F73-9945-A8EE-FBB628EFA778}" type="datetimeFigureOut">
               <a:rPr lang="en-US" smtClean="0"/>
-              <a:t>12/31/25</a:t>
+              <a:t>1/3/26</a:t>
             </a:fld>
             <a:endParaRPr lang="en-US"/>
           </a:p>
@@ -678,7 +678,7 @@
           <a:p>
             <a:fld id="{87AB81C4-7F73-9945-A8EE-FBB628EFA778}" type="datetimeFigureOut">
               <a:rPr lang="en-US" smtClean="0"/>
-              <a:t>12/31/25</a:t>
+              <a:t>1/3/26</a:t>
             </a:fld>
             <a:endParaRPr lang="en-US"/>
           </a:p>
@@ -878,7 +878,7 @@
           <a:p>
             <a:fld id="{87AB81C4-7F73-9945-A8EE-FBB628EFA778}" type="datetimeFigureOut">
               <a:rPr lang="en-US" smtClean="0"/>
-              <a:t>12/31/25</a:t>
+              <a:t>1/3/26</a:t>
             </a:fld>
             <a:endParaRPr lang="en-US"/>
           </a:p>
@@ -1154,7 +1154,7 @@
           <a:p>
             <a:fld id="{87AB81C4-7F73-9945-A8EE-FBB628EFA778}" type="datetimeFigureOut">
               <a:rPr lang="en-US" smtClean="0"/>
-              <a:t>12/31/25</a:t>
+              <a:t>1/3/26</a:t>
             </a:fld>
             <a:endParaRPr lang="en-US"/>
           </a:p>
@@ -1422,7 +1422,7 @@
           <a:p>
             <a:fld id="{87AB81C4-7F73-9945-A8EE-FBB628EFA778}" type="datetimeFigureOut">
               <a:rPr lang="en-US" smtClean="0"/>
-              <a:t>12/31/25</a:t>
+              <a:t>1/3/26</a:t>
             </a:fld>
             <a:endParaRPr lang="en-US"/>
           </a:p>
@@ -1837,7 +1837,7 @@
           <a:p>
             <a:fld id="{87AB81C4-7F73-9945-A8EE-FBB628EFA778}" type="datetimeFigureOut">
               <a:rPr lang="en-US" smtClean="0"/>
-              <a:t>12/31/25</a:t>
+              <a:t>1/3/26</a:t>
             </a:fld>
             <a:endParaRPr lang="en-US"/>
           </a:p>
@@ -1979,7 +1979,7 @@
           <a:p>
             <a:fld id="{87AB81C4-7F73-9945-A8EE-FBB628EFA778}" type="datetimeFigureOut">
               <a:rPr lang="en-US" smtClean="0"/>
-              <a:t>12/31/25</a:t>
+              <a:t>1/3/26</a:t>
             </a:fld>
             <a:endParaRPr lang="en-US"/>
           </a:p>
@@ -2092,7 +2092,7 @@
           <a:p>
             <a:fld id="{87AB81C4-7F73-9945-A8EE-FBB628EFA778}" type="datetimeFigureOut">
               <a:rPr lang="en-US" smtClean="0"/>
-              <a:t>12/31/25</a:t>
+              <a:t>1/3/26</a:t>
             </a:fld>
             <a:endParaRPr lang="en-US"/>
           </a:p>
@@ -2405,7 +2405,7 @@
           <a:p>
             <a:fld id="{87AB81C4-7F73-9945-A8EE-FBB628EFA778}" type="datetimeFigureOut">
               <a:rPr lang="en-US" smtClean="0"/>
-              <a:t>12/31/25</a:t>
+              <a:t>1/3/26</a:t>
             </a:fld>
             <a:endParaRPr lang="en-US"/>
           </a:p>
@@ -2694,7 +2694,7 @@
           <a:p>
             <a:fld id="{87AB81C4-7F73-9945-A8EE-FBB628EFA778}" type="datetimeFigureOut">
               <a:rPr lang="en-US" smtClean="0"/>
-              <a:t>12/31/25</a:t>
+              <a:t>1/3/26</a:t>
             </a:fld>
             <a:endParaRPr lang="en-US"/>
           </a:p>
@@ -2937,7 +2937,7 @@
           <a:p>
             <a:fld id="{87AB81C4-7F73-9945-A8EE-FBB628EFA778}" type="datetimeFigureOut">
               <a:rPr lang="en-US" smtClean="0"/>
-              <a:t>12/31/25</a:t>
+              <a:t>1/3/26</a:t>
             </a:fld>
             <a:endParaRPr lang="en-US"/>
           </a:p>
@@ -3876,7 +3876,7 @@
         </p:blipFill>
         <p:spPr>
           <a:xfrm>
-            <a:off x="6096000" y="2512060"/>
+            <a:off x="114300" y="2478221"/>
             <a:ext cx="5981700" cy="1524000"/>
           </a:xfrm>
           <a:prstGeom prst="rect">
@@ -3906,7 +3906,7 @@
         </p:blipFill>
         <p:spPr>
           <a:xfrm>
-            <a:off x="269241" y="2509660"/>
+            <a:off x="6351608" y="2475821"/>
             <a:ext cx="5567606" cy="1526400"/>
           </a:xfrm>
           <a:prstGeom prst="rect">

</xml_diff>